<commit_message>
Final fixes before lecture
</commit_message>
<xml_diff>
--- a/unit2/Unit2b - C++ Einfuehrung.pptx
+++ b/unit2/Unit2b - C++ Einfuehrung.pptx
@@ -358,7 +358,7 @@
             <a:fld id="{AA592FF2-A4BD-4E98-AC76-A10007E04C10}" type="datetimeFigureOut">
               <a:rPr lang="en-US" smtClean="0"/>
               <a:pPr/>
-              <a:t>4/7/24</a:t>
+              <a:t>4/13/24</a:t>
             </a:fld>
             <a:endParaRPr lang="en-US" dirty="0"/>
           </a:p>
@@ -1215,7 +1215,7 @@
             <a:fld id="{AA592FF2-A4BD-4E98-AC76-A10007E04C10}" type="datetimeFigureOut">
               <a:rPr lang="en-US" smtClean="0"/>
               <a:pPr/>
-              <a:t>4/7/24</a:t>
+              <a:t>4/13/24</a:t>
             </a:fld>
             <a:endParaRPr lang="en-US" dirty="0"/>
           </a:p>
@@ -24824,7 +24824,7 @@
               <a:t>Wenn Klasse </a:t>
             </a:r>
             <a:r>
-              <a:rPr lang="de-DE" dirty="0">
+              <a:rPr lang="de-DE" b="1" dirty="0">
                 <a:latin typeface="Courier New" panose="02070309020205020404" pitchFamily="49" charset="0"/>
                 <a:cs typeface="Courier New" panose="02070309020205020404" pitchFamily="49" charset="0"/>
               </a:rPr>

</xml_diff>